<commit_message>
quick fix to slides
</commit_message>
<xml_diff>
--- a/slides/On-Campus/05_03_StringManipulation.pptx
+++ b/slides/On-Campus/05_03_StringManipulation.pptx
@@ -225,7 +225,7 @@
           <a:p>
             <a:fld id="{4D7E51A5-B478-1E40-8CBB-0DAA8831E99D}" type="datetimeFigureOut">
               <a:rPr lang="en-US" smtClean="0"/>
-              <a:t>9/23/2021</a:t>
+              <a:t>9/24/21</a:t>
             </a:fld>
             <a:endParaRPr lang="en-US"/>
           </a:p>
@@ -390,7 +390,7 @@
           <a:p>
             <a:fld id="{D0ED587F-861E-6740-9643-E3DDAE89B8D6}" type="datetimeFigureOut">
               <a:rPr lang="en-US" smtClean="0"/>
-              <a:t>9/23/2021</a:t>
+              <a:t>9/24/21</a:t>
             </a:fld>
             <a:endParaRPr lang="en-US"/>
           </a:p>
@@ -21173,7 +21173,7 @@
         <p:spPr>
           <a:xfrm>
             <a:off x="2298267" y="4752194"/>
-            <a:ext cx="7034924" cy="2324611"/>
+            <a:ext cx="7034924" cy="857671"/>
           </a:xfrm>
           <a:prstGeom prst="rect">
             <a:avLst/>
@@ -21358,84 +21358,6 @@
             <a:r>
               <a:rPr lang="en-US" dirty="0"/>
               <a:t>Just that there is a second one?</a:t>
-            </a:r>
-          </a:p>
-          <a:p>
-            <a:pPr marL="0" indent="0">
-              <a:buNone/>
-            </a:pPr>
-            <a:r>
-              <a:rPr lang="en-US" dirty="0">
-                <a:latin typeface="Consolas" panose="020B0609020204030204" pitchFamily="49" charset="0"/>
-                <a:cs typeface="Consolas" panose="020B0609020204030204" pitchFamily="49" charset="0"/>
-              </a:rPr>
-              <a:t>int start = </a:t>
-            </a:r>
-            <a:r>
-              <a:rPr lang="en-US" dirty="0" err="1">
-                <a:latin typeface="Consolas" panose="020B0609020204030204" pitchFamily="49" charset="0"/>
-                <a:cs typeface="Consolas" panose="020B0609020204030204" pitchFamily="49" charset="0"/>
-              </a:rPr>
-              <a:t>palindrome.indexOf</a:t>
-            </a:r>
-            <a:r>
-              <a:rPr lang="en-US" dirty="0">
-                <a:latin typeface="Consolas" panose="020B0609020204030204" pitchFamily="49" charset="0"/>
-                <a:cs typeface="Consolas" panose="020B0609020204030204" pitchFamily="49" charset="0"/>
-              </a:rPr>
-              <a:t>(‘k’);</a:t>
-            </a:r>
-          </a:p>
-          <a:p>
-            <a:pPr marL="0" indent="0">
-              <a:buNone/>
-            </a:pPr>
-            <a:r>
-              <a:rPr lang="en-US" dirty="0" err="1">
-                <a:latin typeface="Consolas" panose="020B0609020204030204" pitchFamily="49" charset="0"/>
-                <a:cs typeface="Consolas" panose="020B0609020204030204" pitchFamily="49" charset="0"/>
-              </a:rPr>
-              <a:t>palindrome.indexOf</a:t>
-            </a:r>
-            <a:r>
-              <a:rPr lang="en-US" dirty="0">
-                <a:latin typeface="Consolas" panose="020B0609020204030204" pitchFamily="49" charset="0"/>
-                <a:cs typeface="Consolas" panose="020B0609020204030204" pitchFamily="49" charset="0"/>
-              </a:rPr>
-              <a:t>(‘k’, start+1);</a:t>
-            </a:r>
-          </a:p>
-          <a:p>
-            <a:pPr marL="0" indent="0">
-              <a:buNone/>
-            </a:pPr>
-            <a:r>
-              <a:rPr lang="en-US" dirty="0" err="1">
-                <a:latin typeface="Consolas" panose="020B0609020204030204" pitchFamily="49" charset="0"/>
-                <a:cs typeface="Consolas" panose="020B0609020204030204" pitchFamily="49" charset="0"/>
-              </a:rPr>
-              <a:t>palindrome.indexOf</a:t>
-            </a:r>
-            <a:r>
-              <a:rPr lang="en-US" dirty="0">
-                <a:latin typeface="Consolas" panose="020B0609020204030204" pitchFamily="49" charset="0"/>
-                <a:cs typeface="Consolas" panose="020B0609020204030204" pitchFamily="49" charset="0"/>
-              </a:rPr>
-              <a:t>(‘k’, </a:t>
-            </a:r>
-            <a:r>
-              <a:rPr lang="en-US" dirty="0" err="1">
-                <a:latin typeface="Consolas" panose="020B0609020204030204" pitchFamily="49" charset="0"/>
-                <a:cs typeface="Consolas" panose="020B0609020204030204" pitchFamily="49" charset="0"/>
-              </a:rPr>
-              <a:t>palindrome.indexOf</a:t>
-            </a:r>
-            <a:r>
-              <a:rPr lang="en-US" dirty="0">
-                <a:latin typeface="Consolas" panose="020B0609020204030204" pitchFamily="49" charset="0"/>
-                <a:cs typeface="Consolas" panose="020B0609020204030204" pitchFamily="49" charset="0"/>
-              </a:rPr>
-              <a:t>(‘k’)+1);</a:t>
             </a:r>
           </a:p>
         </p:txBody>
@@ -22573,189 +22495,6 @@
                       </p:childTnLst>
                     </p:cTn>
                   </p:par>
-                  <p:par>
-                    <p:cTn id="52" fill="hold">
-                      <p:stCondLst>
-                        <p:cond delay="indefinite"/>
-                      </p:stCondLst>
-                      <p:childTnLst>
-                        <p:par>
-                          <p:cTn id="53" fill="hold">
-                            <p:stCondLst>
-                              <p:cond delay="0"/>
-                            </p:stCondLst>
-                            <p:childTnLst>
-                              <p:par>
-                                <p:cTn id="54" presetID="9" presetClass="entr" presetSubtype="0" fill="hold" grpId="0" nodeType="clickEffect">
-                                  <p:stCondLst>
-                                    <p:cond delay="0"/>
-                                  </p:stCondLst>
-                                  <p:childTnLst>
-                                    <p:set>
-                                      <p:cBhvr>
-                                        <p:cTn id="55" dur="1" fill="hold">
-                                          <p:stCondLst>
-                                            <p:cond delay="0"/>
-                                          </p:stCondLst>
-                                        </p:cTn>
-                                        <p:tgtEl>
-                                          <p:spTgt spid="31">
-                                            <p:txEl>
-                                              <p:pRg st="2" end="2"/>
-                                            </p:txEl>
-                                          </p:spTgt>
-                                        </p:tgtEl>
-                                        <p:attrNameLst>
-                                          <p:attrName>style.visibility</p:attrName>
-                                        </p:attrNameLst>
-                                      </p:cBhvr>
-                                      <p:to>
-                                        <p:strVal val="visible"/>
-                                      </p:to>
-                                    </p:set>
-                                    <p:animEffect transition="in" filter="dissolve">
-                                      <p:cBhvr>
-                                        <p:cTn id="56" dur="500"/>
-                                        <p:tgtEl>
-                                          <p:spTgt spid="31">
-                                            <p:txEl>
-                                              <p:pRg st="2" end="2"/>
-                                            </p:txEl>
-                                          </p:spTgt>
-                                        </p:tgtEl>
-                                      </p:cBhvr>
-                                    </p:animEffect>
-                                  </p:childTnLst>
-                                </p:cTn>
-                              </p:par>
-                            </p:childTnLst>
-                          </p:cTn>
-                        </p:par>
-                      </p:childTnLst>
-                    </p:cTn>
-                  </p:par>
-                  <p:par>
-                    <p:cTn id="57" fill="hold">
-                      <p:stCondLst>
-                        <p:cond delay="indefinite"/>
-                      </p:stCondLst>
-                      <p:childTnLst>
-                        <p:par>
-                          <p:cTn id="58" fill="hold">
-                            <p:stCondLst>
-                              <p:cond delay="0"/>
-                            </p:stCondLst>
-                            <p:childTnLst>
-                              <p:par>
-                                <p:cTn id="59" presetID="9" presetClass="entr" presetSubtype="0" fill="hold" grpId="0" nodeType="clickEffect">
-                                  <p:stCondLst>
-                                    <p:cond delay="0"/>
-                                  </p:stCondLst>
-                                  <p:childTnLst>
-                                    <p:set>
-                                      <p:cBhvr>
-                                        <p:cTn id="60" dur="1" fill="hold">
-                                          <p:stCondLst>
-                                            <p:cond delay="0"/>
-                                          </p:stCondLst>
-                                        </p:cTn>
-                                        <p:tgtEl>
-                                          <p:spTgt spid="31">
-                                            <p:txEl>
-                                              <p:pRg st="3" end="3"/>
-                                            </p:txEl>
-                                          </p:spTgt>
-                                        </p:tgtEl>
-                                        <p:attrNameLst>
-                                          <p:attrName>style.visibility</p:attrName>
-                                        </p:attrNameLst>
-                                      </p:cBhvr>
-                                      <p:to>
-                                        <p:strVal val="visible"/>
-                                      </p:to>
-                                    </p:set>
-                                    <p:animEffect transition="in" filter="dissolve">
-                                      <p:cBhvr>
-                                        <p:cTn id="61" dur="500"/>
-                                        <p:tgtEl>
-                                          <p:spTgt spid="31">
-                                            <p:txEl>
-                                              <p:pRg st="3" end="3"/>
-                                            </p:txEl>
-                                          </p:spTgt>
-                                        </p:tgtEl>
-                                      </p:cBhvr>
-                                    </p:animEffect>
-                                  </p:childTnLst>
-                                </p:cTn>
-                              </p:par>
-                            </p:childTnLst>
-                          </p:cTn>
-                        </p:par>
-                      </p:childTnLst>
-                    </p:cTn>
-                  </p:par>
-                  <p:par>
-                    <p:cTn id="62" fill="hold">
-                      <p:stCondLst>
-                        <p:cond delay="indefinite"/>
-                      </p:stCondLst>
-                      <p:childTnLst>
-                        <p:par>
-                          <p:cTn id="63" fill="hold">
-                            <p:stCondLst>
-                              <p:cond delay="0"/>
-                            </p:stCondLst>
-                            <p:childTnLst>
-                              <p:par>
-                                <p:cTn id="64" presetID="9" presetClass="entr" presetSubtype="0" fill="hold" grpId="0" nodeType="clickEffect">
-                                  <p:stCondLst>
-                                    <p:cond delay="0"/>
-                                  </p:stCondLst>
-                                  <p:childTnLst>
-                                    <p:set>
-                                      <p:cBhvr>
-                                        <p:cTn id="65" dur="1" fill="hold">
-                                          <p:stCondLst>
-                                            <p:cond delay="0"/>
-                                          </p:stCondLst>
-                                        </p:cTn>
-                                        <p:tgtEl>
-                                          <p:spTgt spid="31">
-                                            <p:txEl>
-                                              <p:pRg st="4" end="4"/>
-                                            </p:txEl>
-                                          </p:spTgt>
-                                        </p:tgtEl>
-                                        <p:attrNameLst>
-                                          <p:attrName>style.visibility</p:attrName>
-                                        </p:attrNameLst>
-                                      </p:cBhvr>
-                                      <p:to>
-                                        <p:strVal val="visible"/>
-                                      </p:to>
-                                    </p:set>
-                                    <p:animEffect transition="in" filter="dissolve">
-                                      <p:cBhvr>
-                                        <p:cTn id="66" dur="500"/>
-                                        <p:tgtEl>
-                                          <p:spTgt spid="31">
-                                            <p:txEl>
-                                              <p:pRg st="4" end="4"/>
-                                            </p:txEl>
-                                          </p:spTgt>
-                                        </p:tgtEl>
-                                      </p:cBhvr>
-                                    </p:animEffect>
-                                  </p:childTnLst>
-                                </p:cTn>
-                              </p:par>
-                            </p:childTnLst>
-                          </p:cTn>
-                        </p:par>
-                      </p:childTnLst>
-                    </p:cTn>
-                  </p:par>
                 </p:childTnLst>
               </p:cTn>
               <p:prevCondLst>
@@ -22956,6 +22695,107 @@
           </a:p>
         </p:txBody>
       </p:sp>
+      <p:sp>
+        <p:nvSpPr>
+          <p:cNvPr id="4" name="TextBox 3">
+            <a:extLst>
+              <a:ext uri="{FF2B5EF4-FFF2-40B4-BE49-F238E27FC236}">
+                <a16:creationId xmlns:a16="http://schemas.microsoft.com/office/drawing/2014/main" id="{EB973A2D-A446-F449-B74A-FE5B5A485EE4}"/>
+              </a:ext>
+            </a:extLst>
+          </p:cNvPr>
+          <p:cNvSpPr txBox="1"/>
+          <p:nvPr/>
+        </p:nvSpPr>
+        <p:spPr>
+          <a:xfrm>
+            <a:off x="2991556" y="5995717"/>
+            <a:ext cx="8681156" cy="1323439"/>
+          </a:xfrm>
+          <a:prstGeom prst="rect">
+            <a:avLst/>
+          </a:prstGeom>
+          <a:noFill/>
+        </p:spPr>
+        <p:txBody>
+          <a:bodyPr wrap="square" rtlCol="0">
+            <a:spAutoFit/>
+          </a:bodyPr>
+          <a:lstStyle/>
+          <a:p>
+            <a:r>
+              <a:rPr lang="en-US" dirty="0">
+                <a:latin typeface="Consolas" panose="020B0609020204030204" pitchFamily="49" charset="0"/>
+                <a:cs typeface="Consolas" panose="020B0609020204030204" pitchFamily="49" charset="0"/>
+              </a:rPr>
+              <a:t>int start = </a:t>
+            </a:r>
+            <a:r>
+              <a:rPr lang="en-US" dirty="0" err="1">
+                <a:latin typeface="Consolas" panose="020B0609020204030204" pitchFamily="49" charset="0"/>
+                <a:cs typeface="Consolas" panose="020B0609020204030204" pitchFamily="49" charset="0"/>
+              </a:rPr>
+              <a:t>palindrome.indexOf</a:t>
+            </a:r>
+            <a:r>
+              <a:rPr lang="en-US" dirty="0">
+                <a:latin typeface="Consolas" panose="020B0609020204030204" pitchFamily="49" charset="0"/>
+                <a:cs typeface="Consolas" panose="020B0609020204030204" pitchFamily="49" charset="0"/>
+              </a:rPr>
+              <a:t>(‘k’);</a:t>
+            </a:r>
+          </a:p>
+          <a:p>
+            <a:r>
+              <a:rPr lang="en-US" dirty="0" err="1">
+                <a:latin typeface="Consolas" panose="020B0609020204030204" pitchFamily="49" charset="0"/>
+                <a:cs typeface="Consolas" panose="020B0609020204030204" pitchFamily="49" charset="0"/>
+              </a:rPr>
+              <a:t>palindrome.indexOf</a:t>
+            </a:r>
+            <a:r>
+              <a:rPr lang="en-US" dirty="0">
+                <a:latin typeface="Consolas" panose="020B0609020204030204" pitchFamily="49" charset="0"/>
+                <a:cs typeface="Consolas" panose="020B0609020204030204" pitchFamily="49" charset="0"/>
+              </a:rPr>
+              <a:t>(‘k’, start+1);</a:t>
+            </a:r>
+          </a:p>
+          <a:p>
+            <a:r>
+              <a:rPr lang="en-US" dirty="0" err="1">
+                <a:latin typeface="Consolas" panose="020B0609020204030204" pitchFamily="49" charset="0"/>
+                <a:cs typeface="Consolas" panose="020B0609020204030204" pitchFamily="49" charset="0"/>
+              </a:rPr>
+              <a:t>palindrome.indexOf</a:t>
+            </a:r>
+            <a:r>
+              <a:rPr lang="en-US" dirty="0">
+                <a:latin typeface="Consolas" panose="020B0609020204030204" pitchFamily="49" charset="0"/>
+                <a:cs typeface="Consolas" panose="020B0609020204030204" pitchFamily="49" charset="0"/>
+              </a:rPr>
+              <a:t>(‘k’, </a:t>
+            </a:r>
+            <a:r>
+              <a:rPr lang="en-US" dirty="0" err="1">
+                <a:latin typeface="Consolas" panose="020B0609020204030204" pitchFamily="49" charset="0"/>
+                <a:cs typeface="Consolas" panose="020B0609020204030204" pitchFamily="49" charset="0"/>
+              </a:rPr>
+              <a:t>palindrome.indexOf</a:t>
+            </a:r>
+            <a:r>
+              <a:rPr lang="en-US" dirty="0">
+                <a:latin typeface="Consolas" panose="020B0609020204030204" pitchFamily="49" charset="0"/>
+                <a:cs typeface="Consolas" panose="020B0609020204030204" pitchFamily="49" charset="0"/>
+              </a:rPr>
+              <a:t>(‘k’)+1);</a:t>
+            </a:r>
+          </a:p>
+          <a:p>
+            <a:endParaRPr lang="en-US" dirty="0"/>
+          </a:p>
+        </p:txBody>
+      </p:sp>
     </p:spTree>
     <p:extLst>
       <p:ext uri="{BB962C8B-B14F-4D97-AF65-F5344CB8AC3E}">
@@ -22978,6 +22818,92 @@
       </p:transition>
     </mc:Fallback>
   </mc:AlternateContent>
+  <p:timing>
+    <p:tnLst>
+      <p:par>
+        <p:cTn id="1" dur="indefinite" restart="never" nodeType="tmRoot">
+          <p:childTnLst>
+            <p:seq concurrent="1" nextAc="seek">
+              <p:cTn id="2" dur="indefinite" nodeType="mainSeq">
+                <p:childTnLst>
+                  <p:par>
+                    <p:cTn id="3" fill="hold">
+                      <p:stCondLst>
+                        <p:cond delay="indefinite"/>
+                      </p:stCondLst>
+                      <p:childTnLst>
+                        <p:par>
+                          <p:cTn id="4" fill="hold">
+                            <p:stCondLst>
+                              <p:cond delay="0"/>
+                            </p:stCondLst>
+                            <p:childTnLst>
+                              <p:par>
+                                <p:cTn id="5" presetID="9" presetClass="entr" presetSubtype="0" fill="hold" grpId="0" nodeType="clickEffect">
+                                  <p:stCondLst>
+                                    <p:cond delay="0"/>
+                                  </p:stCondLst>
+                                  <p:childTnLst>
+                                    <p:set>
+                                      <p:cBhvr>
+                                        <p:cTn id="6" dur="1" fill="hold">
+                                          <p:stCondLst>
+                                            <p:cond delay="0"/>
+                                          </p:stCondLst>
+                                        </p:cTn>
+                                        <p:tgtEl>
+                                          <p:spTgt spid="4"/>
+                                        </p:tgtEl>
+                                        <p:attrNameLst>
+                                          <p:attrName>style.visibility</p:attrName>
+                                        </p:attrNameLst>
+                                      </p:cBhvr>
+                                      <p:to>
+                                        <p:strVal val="visible"/>
+                                      </p:to>
+                                    </p:set>
+                                    <p:animEffect transition="in" filter="dissolve">
+                                      <p:cBhvr>
+                                        <p:cTn id="7" dur="500"/>
+                                        <p:tgtEl>
+                                          <p:spTgt spid="4"/>
+                                        </p:tgtEl>
+                                      </p:cBhvr>
+                                    </p:animEffect>
+                                  </p:childTnLst>
+                                </p:cTn>
+                              </p:par>
+                            </p:childTnLst>
+                          </p:cTn>
+                        </p:par>
+                      </p:childTnLst>
+                    </p:cTn>
+                  </p:par>
+                </p:childTnLst>
+              </p:cTn>
+              <p:prevCondLst>
+                <p:cond evt="onPrev" delay="0">
+                  <p:tgtEl>
+                    <p:sldTgt/>
+                  </p:tgtEl>
+                </p:cond>
+              </p:prevCondLst>
+              <p:nextCondLst>
+                <p:cond evt="onNext" delay="0">
+                  <p:tgtEl>
+                    <p:sldTgt/>
+                  </p:tgtEl>
+                </p:cond>
+              </p:nextCondLst>
+            </p:seq>
+          </p:childTnLst>
+        </p:cTn>
+      </p:par>
+    </p:tnLst>
+    <p:bldLst>
+      <p:bldP spid="4" grpId="0"/>
+    </p:bldLst>
+  </p:timing>
 </p:sld>
 </file>
 

</xml_diff>